<commit_message>
Presentation & Activity Update
</commit_message>
<xml_diff>
--- a/Presentations/DayPlan/Full Presentation.pptx
+++ b/Presentations/DayPlan/Full Presentation.pptx
@@ -6608,7 +6608,7 @@
           <a:p>
             <a:fld id="{56DA6BE2-F309-C145-93AC-13335DCF7E2A}" type="datetimeFigureOut">
               <a:rPr lang="en-US" smtClean="0"/>
-              <a:t>1/7/25</a:t>
+              <a:t>1/13/25</a:t>
             </a:fld>
             <a:endParaRPr lang="en-US"/>
           </a:p>
@@ -7027,7 +7027,7 @@
           <a:p>
             <a:fld id="{6581E878-A43D-DD47-B90D-8C10E2AB5A0F}" type="datetime1">
               <a:rPr lang="en-GB" smtClean="0"/>
-              <a:t>07/01/2025</a:t>
+              <a:t>13/01/2025</a:t>
             </a:fld>
             <a:endParaRPr lang="en-US"/>
           </a:p>
@@ -7230,7 +7230,7 @@
           <a:p>
             <a:fld id="{93A1A8E1-ED4C-3447-B601-7E74B3C5BD79}" type="datetime1">
               <a:rPr lang="en-GB" smtClean="0"/>
-              <a:t>07/01/2025</a:t>
+              <a:t>13/01/2025</a:t>
             </a:fld>
             <a:endParaRPr lang="en-US"/>
           </a:p>
@@ -7451,7 +7451,7 @@
           <a:p>
             <a:fld id="{9C9E4095-BE22-7247-B913-F934B361C0A6}" type="datetime1">
               <a:rPr lang="en-GB" smtClean="0"/>
-              <a:t>07/01/2025</a:t>
+              <a:t>13/01/2025</a:t>
             </a:fld>
             <a:endParaRPr lang="en-US"/>
           </a:p>
@@ -7604,7 +7604,7 @@
           <a:p>
             <a:fld id="{44400636-3EE2-674F-A4D3-0BAC6EBA81F4}" type="datetime1">
               <a:rPr lang="en-GB" smtClean="0"/>
-              <a:t>07/01/2025</a:t>
+              <a:t>13/01/2025</a:t>
             </a:fld>
             <a:endParaRPr lang="en-US"/>
           </a:p>
@@ -7805,7 +7805,7 @@
           <a:p>
             <a:fld id="{328A6CFB-8076-FF4C-901A-2D349C2F3CE8}" type="datetime1">
               <a:rPr lang="en-GB" smtClean="0"/>
-              <a:t>07/01/2025</a:t>
+              <a:t>13/01/2025</a:t>
             </a:fld>
             <a:endParaRPr lang="en-US"/>
           </a:p>
@@ -8065,7 +8065,7 @@
           <a:p>
             <a:fld id="{BC95F4EA-D634-624D-B6F4-F469819D4D97}" type="datetime1">
               <a:rPr lang="en-GB" smtClean="0"/>
-              <a:t>07/01/2025</a:t>
+              <a:t>13/01/2025</a:t>
             </a:fld>
             <a:endParaRPr lang="en-US"/>
           </a:p>
@@ -8352,7 +8352,7 @@
           <a:p>
             <a:fld id="{5153266D-035E-9246-9488-656C43B991F3}" type="datetime1">
               <a:rPr lang="en-GB" smtClean="0"/>
-              <a:t>07/01/2025</a:t>
+              <a:t>13/01/2025</a:t>
             </a:fld>
             <a:endParaRPr lang="en-US"/>
           </a:p>
@@ -8631,7 +8631,7 @@
           <a:p>
             <a:fld id="{9F570B4D-C3E7-C64B-ACB3-A5A270B6F24D}" type="datetime1">
               <a:rPr lang="en-GB" smtClean="0"/>
-              <a:t>07/01/2025</a:t>
+              <a:t>13/01/2025</a:t>
             </a:fld>
             <a:endParaRPr lang="en-US"/>
           </a:p>
@@ -9057,7 +9057,7 @@
           <a:p>
             <a:fld id="{6D5C9D7B-1A39-1C41-8628-1E5F8A62C2E4}" type="datetime1">
               <a:rPr lang="en-GB" smtClean="0"/>
-              <a:t>07/01/2025</a:t>
+              <a:t>13/01/2025</a:t>
             </a:fld>
             <a:endParaRPr lang="en-US"/>
           </a:p>
@@ -9210,7 +9210,7 @@
           <a:p>
             <a:fld id="{136132D7-E3DF-4C4A-B20C-0C58814F08AB}" type="datetime1">
               <a:rPr lang="en-GB" smtClean="0"/>
-              <a:t>07/01/2025</a:t>
+              <a:t>13/01/2025</a:t>
             </a:fld>
             <a:endParaRPr lang="en-US"/>
           </a:p>
@@ -9334,7 +9334,7 @@
           <a:p>
             <a:fld id="{5CDE504E-BA97-F546-8DF8-B07BB1857424}" type="datetime1">
               <a:rPr lang="en-GB" smtClean="0"/>
-              <a:t>07/01/2025</a:t>
+              <a:t>13/01/2025</a:t>
             </a:fld>
             <a:endParaRPr lang="en-US"/>
           </a:p>
@@ -9658,7 +9658,7 @@
           <a:p>
             <a:fld id="{A5CD632E-FAB4-B143-A22A-60CCE47B0D6C}" type="datetime1">
               <a:rPr lang="en-GB" smtClean="0"/>
-              <a:t>07/01/2025</a:t>
+              <a:t>13/01/2025</a:t>
             </a:fld>
             <a:endParaRPr lang="en-US"/>
           </a:p>
@@ -9962,7 +9962,7 @@
           <a:p>
             <a:fld id="{6D529D7B-00FC-FE44-9E4E-9C5D6F13486F}" type="datetime1">
               <a:rPr lang="en-GB" smtClean="0"/>
-              <a:t>07/01/2025</a:t>
+              <a:t>13/01/2025</a:t>
             </a:fld>
             <a:endParaRPr lang="en-US"/>
           </a:p>
@@ -10247,7 +10247,7 @@
           <a:p>
             <a:fld id="{6581E878-A43D-DD47-B90D-8C10E2AB5A0F}" type="datetime1">
               <a:rPr lang="en-GB" smtClean="0"/>
-              <a:t>07/01/2025</a:t>
+              <a:t>13/01/2025</a:t>
             </a:fld>
             <a:endParaRPr lang="en-US"/>
           </a:p>
@@ -11040,7 +11040,7 @@
             <p:ph idx="1"/>
             <p:extLst>
               <p:ext uri="{D42A27DB-BD31-4B8C-83A1-F6EECF244321}">
-                <p14:modId xmlns:p14="http://schemas.microsoft.com/office/powerpoint/2010/main" val="964380156"/>
+                <p14:modId xmlns:p14="http://schemas.microsoft.com/office/powerpoint/2010/main" val="2042996110"/>
               </p:ext>
             </p:extLst>
           </p:nvPr>
@@ -11077,6 +11077,7 @@
                     <a:bodyPr/>
                     <a:lstStyle/>
                     <a:p>
+                      <a:pPr algn="l"/>
                       <a:endParaRPr lang="en-GB" dirty="0">
                         <a:solidFill>
                           <a:schemeClr val="tx1"/>
@@ -11115,16 +11116,84 @@
                     <a:bodyPr/>
                     <a:lstStyle/>
                     <a:p>
+                      <a:pPr algn="l"/>
                       <a:r>
-                        <a:rPr lang="en-GB" b="0" dirty="0">
+                        <a:rPr lang="en-GB" b="1" dirty="0">
                           <a:solidFill>
-                            <a:schemeClr val="tx1"/>
+                            <a:srgbClr val="004D9E"/>
                           </a:solidFill>
                           <a:latin typeface="Arial" panose="020B0604020202020204" pitchFamily="34" charset="0"/>
                           <a:cs typeface="Arial" panose="020B0604020202020204" pitchFamily="34" charset="0"/>
                         </a:rPr>
-                        <a:t>tbc</a:t>
+                        <a:t>Dr </a:t>
                       </a:r>
+                      <a:r>
+                        <a:rPr lang="en-GB" sz="1800" b="1" i="0" kern="1200" dirty="0">
+                          <a:solidFill>
+                            <a:srgbClr val="004D9E"/>
+                          </a:solidFill>
+                          <a:effectLst/>
+                          <a:latin typeface="+mn-lt"/>
+                          <a:ea typeface="+mn-ea"/>
+                          <a:cs typeface="+mn-cs"/>
+                        </a:rPr>
+                        <a:t>Hannah Rose </a:t>
+                      </a:r>
+                      <a:r>
+                        <a:rPr lang="en-GB" sz="1800" b="1" i="0" kern="1200" dirty="0" err="1">
+                          <a:solidFill>
+                            <a:srgbClr val="004D9E"/>
+                          </a:solidFill>
+                          <a:effectLst/>
+                          <a:latin typeface="+mn-lt"/>
+                          <a:ea typeface="+mn-ea"/>
+                          <a:cs typeface="+mn-cs"/>
+                        </a:rPr>
+                        <a:t>Vineer</a:t>
+                      </a:r>
+                      <a:r>
+                        <a:rPr lang="en-GB" sz="1800" b="1" i="0" kern="1200" dirty="0">
+                          <a:solidFill>
+                            <a:srgbClr val="004D9E"/>
+                          </a:solidFill>
+                          <a:effectLst/>
+                          <a:latin typeface="+mn-lt"/>
+                          <a:ea typeface="+mn-ea"/>
+                          <a:cs typeface="+mn-cs"/>
+                        </a:rPr>
+                        <a:t> </a:t>
+                      </a:r>
+                      <a:r>
+                        <a:rPr lang="en-GB" sz="1800" b="0" i="0" kern="1200" dirty="0">
+                          <a:solidFill>
+                            <a:schemeClr val="tx1"/>
+                          </a:solidFill>
+                          <a:effectLst/>
+                          <a:latin typeface="+mn-lt"/>
+                          <a:ea typeface="+mn-ea"/>
+                          <a:cs typeface="+mn-cs"/>
+                        </a:rPr>
+                        <a:t>– </a:t>
+                      </a:r>
+                      <a:r>
+                        <a:rPr lang="en-GB" sz="1800" b="0" i="1" kern="1200" dirty="0">
+                          <a:solidFill>
+                            <a:srgbClr val="00BB64"/>
+                          </a:solidFill>
+                          <a:effectLst/>
+                          <a:latin typeface="+mn-lt"/>
+                          <a:ea typeface="+mn-ea"/>
+                          <a:cs typeface="+mn-cs"/>
+                        </a:rPr>
+                        <a:t>University of Liverpool &amp; VBD Hub</a:t>
+                      </a:r>
+                      <a:endParaRPr lang="en-GB" b="1" i="1" dirty="0">
+                        <a:solidFill>
+                          <a:srgbClr val="00BB64"/>
+                        </a:solidFill>
+                        <a:latin typeface="Arial" panose="020B0604020202020204" pitchFamily="34" charset="0"/>
+                        <a:cs typeface="Arial" panose="020B0604020202020204" pitchFamily="34" charset="0"/>
+                      </a:endParaRPr>
                     </a:p>
                   </a:txBody>
                   <a:tcPr>
@@ -11163,6 +11232,7 @@
                     <a:bodyPr/>
                     <a:lstStyle/>
                     <a:p>
+                      <a:pPr algn="l"/>
                       <a:endParaRPr lang="en-GB" dirty="0">
                         <a:solidFill>
                           <a:schemeClr val="tx1"/>
@@ -11201,6 +11271,7 @@
                     <a:bodyPr/>
                     <a:lstStyle/>
                     <a:p>
+                      <a:pPr algn="l"/>
                       <a:r>
                         <a:rPr lang="en-GB" b="1" dirty="0">
                           <a:solidFill>
@@ -11269,7 +11340,8 @@
                     <a:bodyPr/>
                     <a:lstStyle/>
                     <a:p>
-                      <a:endParaRPr lang="en-GB">
+                      <a:pPr algn="l"/>
+                      <a:endParaRPr lang="en-GB" dirty="0">
                         <a:solidFill>
                           <a:schemeClr val="tx1"/>
                         </a:solidFill>
@@ -11307,6 +11379,7 @@
                     <a:bodyPr/>
                     <a:lstStyle/>
                     <a:p>
+                      <a:pPr algn="l"/>
                       <a:r>
                         <a:rPr lang="en-GB" b="1" dirty="0">
                           <a:solidFill>
@@ -13923,31 +13996,6 @@
       </p:sp>
       <p:sp>
         <p:nvSpPr>
-          <p:cNvPr id="3" name="Content Placeholder 2">
-            <a:extLst>
-              <a:ext uri="{FF2B5EF4-FFF2-40B4-BE49-F238E27FC236}">
-                <a16:creationId xmlns:a16="http://schemas.microsoft.com/office/drawing/2014/main" id="{92B076A6-E40A-FC1B-0EF6-30B336C80617}"/>
-              </a:ext>
-            </a:extLst>
-          </p:cNvPr>
-          <p:cNvSpPr>
-            <a:spLocks noGrp="1"/>
-          </p:cNvSpPr>
-          <p:nvPr>
-            <p:ph idx="1"/>
-          </p:nvPr>
-        </p:nvSpPr>
-        <p:spPr/>
-        <p:txBody>
-          <a:bodyPr/>
-          <a:lstStyle/>
-          <a:p>
-            <a:endParaRPr lang="en-GB"/>
-          </a:p>
-        </p:txBody>
-      </p:sp>
-      <p:sp>
-        <p:nvSpPr>
           <p:cNvPr id="4" name="Footer Placeholder 3">
             <a:extLst>
               <a:ext uri="{FF2B5EF4-FFF2-40B4-BE49-F238E27FC236}">
@@ -13975,6 +14023,281 @@
           </a:p>
         </p:txBody>
       </p:sp>
+      <p:graphicFrame>
+        <p:nvGraphicFramePr>
+          <p:cNvPr id="5" name="Table 4">
+            <a:extLst>
+              <a:ext uri="{FF2B5EF4-FFF2-40B4-BE49-F238E27FC236}">
+                <a16:creationId xmlns:a16="http://schemas.microsoft.com/office/drawing/2014/main" id="{4FDDF662-362E-F254-F544-19AD0D3AE94E}"/>
+              </a:ext>
+            </a:extLst>
+          </p:cNvPr>
+          <p:cNvGraphicFramePr>
+            <a:graphicFrameLocks noGrp="1"/>
+          </p:cNvGraphicFramePr>
+          <p:nvPr>
+            <p:extLst>
+              <p:ext uri="{D42A27DB-BD31-4B8C-83A1-F6EECF244321}">
+                <p14:modId xmlns:p14="http://schemas.microsoft.com/office/powerpoint/2010/main" val="3945348015"/>
+              </p:ext>
+            </p:extLst>
+          </p:nvPr>
+        </p:nvGraphicFramePr>
+        <p:xfrm>
+          <a:off x="838200" y="1636091"/>
+          <a:ext cx="10439400" cy="3353745"/>
+        </p:xfrm>
+        <a:graphic>
+          <a:graphicData uri="http://schemas.openxmlformats.org/drawingml/2006/table">
+            <a:tbl>
+              <a:tblPr firstRow="1" firstCol="1" bandRow="1">
+                <a:tableStyleId>{5C22544A-7EE6-4342-B048-85BDC9FD1C3A}</a:tableStyleId>
+              </a:tblPr>
+              <a:tblGrid>
+                <a:gridCol w="2949107">
+                  <a:extLst>
+                    <a:ext uri="{9D8B030D-6E8A-4147-A177-3AD203B41FA5}">
+                      <a16:colId xmlns:a16="http://schemas.microsoft.com/office/drawing/2014/main" val="2095981149"/>
+                    </a:ext>
+                  </a:extLst>
+                </a:gridCol>
+                <a:gridCol w="7490293">
+                  <a:extLst>
+                    <a:ext uri="{9D8B030D-6E8A-4147-A177-3AD203B41FA5}">
+                      <a16:colId xmlns:a16="http://schemas.microsoft.com/office/drawing/2014/main" val="3870827945"/>
+                    </a:ext>
+                  </a:extLst>
+                </a:gridCol>
+              </a:tblGrid>
+              <a:tr h="670749">
+                <a:tc>
+                  <a:txBody>
+                    <a:bodyPr/>
+                    <a:lstStyle/>
+                    <a:p>
+                      <a:pPr algn="ctr"/>
+                      <a:r>
+                        <a:rPr lang="en-GB" sz="2000" kern="100" dirty="0">
+                          <a:effectLst/>
+                        </a:rPr>
+                        <a:t>Key Challenge</a:t>
+                      </a:r>
+                      <a:endParaRPr lang="en-GB" sz="2000" kern="100" dirty="0">
+                        <a:effectLst/>
+                        <a:latin typeface="Aptos" panose="020B0004020202020204" pitchFamily="34" charset="0"/>
+                        <a:ea typeface="Aptos" panose="020B0004020202020204" pitchFamily="34" charset="0"/>
+                        <a:cs typeface="Times New Roman" panose="02020603050405020304" pitchFamily="18" charset="0"/>
+                      </a:endParaRPr>
+                    </a:p>
+                  </a:txBody>
+                  <a:tcPr marL="36261" marR="36261" marT="0" marB="0" anchor="ctr"/>
+                </a:tc>
+                <a:tc>
+                  <a:txBody>
+                    <a:bodyPr/>
+                    <a:lstStyle/>
+                    <a:p>
+                      <a:pPr algn="ctr"/>
+                      <a:endParaRPr lang="en-GB" sz="1800" kern="100" dirty="0">
+                        <a:effectLst/>
+                        <a:latin typeface="Aptos" panose="020B0004020202020204" pitchFamily="34" charset="0"/>
+                        <a:ea typeface="Aptos" panose="020B0004020202020204" pitchFamily="34" charset="0"/>
+                        <a:cs typeface="Times New Roman" panose="02020603050405020304" pitchFamily="18" charset="0"/>
+                      </a:endParaRPr>
+                    </a:p>
+                  </a:txBody>
+                  <a:tcPr marL="36261" marR="36261" marT="0" marB="0" anchor="ctr"/>
+                </a:tc>
+                <a:extLst>
+                  <a:ext uri="{0D108BD9-81ED-4DB2-BD59-A6C34878D82A}">
+                    <a16:rowId xmlns:a16="http://schemas.microsoft.com/office/drawing/2014/main" val="3538822886"/>
+                  </a:ext>
+                </a:extLst>
+              </a:tr>
+              <a:tr h="670749">
+                <a:tc>
+                  <a:txBody>
+                    <a:bodyPr/>
+                    <a:lstStyle/>
+                    <a:p>
+                      <a:pPr algn="ctr"/>
+                      <a:r>
+                        <a:rPr lang="en-GB" sz="2000" kern="100" dirty="0">
+                          <a:effectLst/>
+                        </a:rPr>
+                        <a:t>Exam Question</a:t>
+                      </a:r>
+                      <a:endParaRPr lang="en-GB" sz="2000" kern="100" dirty="0">
+                        <a:effectLst/>
+                        <a:latin typeface="Aptos" panose="020B0004020202020204" pitchFamily="34" charset="0"/>
+                        <a:ea typeface="Aptos" panose="020B0004020202020204" pitchFamily="34" charset="0"/>
+                        <a:cs typeface="Times New Roman" panose="02020603050405020304" pitchFamily="18" charset="0"/>
+                      </a:endParaRPr>
+                    </a:p>
+                  </a:txBody>
+                  <a:tcPr marL="36261" marR="36261" marT="0" marB="0" anchor="ctr"/>
+                </a:tc>
+                <a:tc>
+                  <a:txBody>
+                    <a:bodyPr/>
+                    <a:lstStyle/>
+                    <a:p>
+                      <a:pPr algn="ctr"/>
+                      <a:endParaRPr lang="en-GB" sz="1800" kern="100" dirty="0">
+                        <a:effectLst/>
+                        <a:latin typeface="Aptos" panose="020B0004020202020204" pitchFamily="34" charset="0"/>
+                        <a:ea typeface="Aptos" panose="020B0004020202020204" pitchFamily="34" charset="0"/>
+                        <a:cs typeface="Times New Roman" panose="02020603050405020304" pitchFamily="18" charset="0"/>
+                      </a:endParaRPr>
+                    </a:p>
+                  </a:txBody>
+                  <a:tcPr marL="36261" marR="36261" marT="0" marB="0" anchor="ctr"/>
+                </a:tc>
+                <a:extLst>
+                  <a:ext uri="{0D108BD9-81ED-4DB2-BD59-A6C34878D82A}">
+                    <a16:rowId xmlns:a16="http://schemas.microsoft.com/office/drawing/2014/main" val="803328228"/>
+                  </a:ext>
+                </a:extLst>
+              </a:tr>
+              <a:tr h="670749">
+                <a:tc>
+                  <a:txBody>
+                    <a:bodyPr/>
+                    <a:lstStyle/>
+                    <a:p>
+                      <a:pPr algn="ctr"/>
+                      <a:r>
+                        <a:rPr lang="en-GB" sz="2000" kern="100" dirty="0">
+                          <a:effectLst/>
+                        </a:rPr>
+                        <a:t>Usable Data</a:t>
+                      </a:r>
+                      <a:endParaRPr lang="en-GB" sz="2000" kern="100" dirty="0">
+                        <a:effectLst/>
+                        <a:latin typeface="Aptos" panose="020B0004020202020204" pitchFamily="34" charset="0"/>
+                        <a:ea typeface="Aptos" panose="020B0004020202020204" pitchFamily="34" charset="0"/>
+                        <a:cs typeface="Times New Roman" panose="02020603050405020304" pitchFamily="18" charset="0"/>
+                      </a:endParaRPr>
+                    </a:p>
+                  </a:txBody>
+                  <a:tcPr marL="36261" marR="36261" marT="0" marB="0" anchor="ctr"/>
+                </a:tc>
+                <a:tc>
+                  <a:txBody>
+                    <a:bodyPr/>
+                    <a:lstStyle/>
+                    <a:p>
+                      <a:pPr algn="ctr"/>
+                      <a:endParaRPr lang="en-GB" sz="1800" kern="100" dirty="0">
+                        <a:effectLst/>
+                        <a:latin typeface="Aptos" panose="020B0004020202020204" pitchFamily="34" charset="0"/>
+                        <a:ea typeface="Aptos" panose="020B0004020202020204" pitchFamily="34" charset="0"/>
+                        <a:cs typeface="Times New Roman" panose="02020603050405020304" pitchFamily="18" charset="0"/>
+                      </a:endParaRPr>
+                    </a:p>
+                  </a:txBody>
+                  <a:tcPr marL="36261" marR="36261" marT="0" marB="0" anchor="ctr"/>
+                </a:tc>
+                <a:extLst>
+                  <a:ext uri="{0D108BD9-81ED-4DB2-BD59-A6C34878D82A}">
+                    <a16:rowId xmlns:a16="http://schemas.microsoft.com/office/drawing/2014/main" val="151121533"/>
+                  </a:ext>
+                </a:extLst>
+              </a:tr>
+              <a:tr h="670749">
+                <a:tc>
+                  <a:txBody>
+                    <a:bodyPr/>
+                    <a:lstStyle/>
+                    <a:p>
+                      <a:pPr algn="ctr"/>
+                      <a:r>
+                        <a:rPr lang="en-GB" sz="2000" kern="100" dirty="0">
+                          <a:effectLst/>
+                        </a:rPr>
+                        <a:t>Output Format</a:t>
+                      </a:r>
+                      <a:endParaRPr lang="en-GB" sz="2000" kern="100" dirty="0">
+                        <a:effectLst/>
+                        <a:latin typeface="Aptos" panose="020B0004020202020204" pitchFamily="34" charset="0"/>
+                        <a:ea typeface="Aptos" panose="020B0004020202020204" pitchFamily="34" charset="0"/>
+                        <a:cs typeface="Times New Roman" panose="02020603050405020304" pitchFamily="18" charset="0"/>
+                      </a:endParaRPr>
+                    </a:p>
+                  </a:txBody>
+                  <a:tcPr marL="36261" marR="36261" marT="0" marB="0" anchor="ctr"/>
+                </a:tc>
+                <a:tc>
+                  <a:txBody>
+                    <a:bodyPr/>
+                    <a:lstStyle/>
+                    <a:p>
+                      <a:pPr algn="ctr"/>
+                      <a:endParaRPr lang="en-GB" sz="1800" kern="100" dirty="0">
+                        <a:effectLst/>
+                        <a:latin typeface="Aptos" panose="020B0004020202020204" pitchFamily="34" charset="0"/>
+                        <a:ea typeface="Aptos" panose="020B0004020202020204" pitchFamily="34" charset="0"/>
+                        <a:cs typeface="Times New Roman" panose="02020603050405020304" pitchFamily="18" charset="0"/>
+                      </a:endParaRPr>
+                    </a:p>
+                  </a:txBody>
+                  <a:tcPr marL="36261" marR="36261" marT="0" marB="0" anchor="ctr"/>
+                </a:tc>
+                <a:extLst>
+                  <a:ext uri="{0D108BD9-81ED-4DB2-BD59-A6C34878D82A}">
+                    <a16:rowId xmlns:a16="http://schemas.microsoft.com/office/drawing/2014/main" val="2005488218"/>
+                  </a:ext>
+                </a:extLst>
+              </a:tr>
+              <a:tr h="670749">
+                <a:tc>
+                  <a:txBody>
+                    <a:bodyPr/>
+                    <a:lstStyle/>
+                    <a:p>
+                      <a:pPr algn="ctr"/>
+                      <a:r>
+                        <a:rPr lang="en-GB" sz="2000" kern="100" dirty="0">
+                          <a:effectLst/>
+                        </a:rPr>
+                        <a:t>Other Information</a:t>
+                      </a:r>
+                      <a:endParaRPr lang="en-GB" sz="2000" kern="100" dirty="0">
+                        <a:effectLst/>
+                        <a:latin typeface="Aptos" panose="020B0004020202020204" pitchFamily="34" charset="0"/>
+                        <a:ea typeface="Aptos" panose="020B0004020202020204" pitchFamily="34" charset="0"/>
+                        <a:cs typeface="Times New Roman" panose="02020603050405020304" pitchFamily="18" charset="0"/>
+                      </a:endParaRPr>
+                    </a:p>
+                  </a:txBody>
+                  <a:tcPr marL="36261" marR="36261" marT="0" marB="0" anchor="ctr"/>
+                </a:tc>
+                <a:tc>
+                  <a:txBody>
+                    <a:bodyPr/>
+                    <a:lstStyle/>
+                    <a:p>
+                      <a:pPr algn="ctr"/>
+                      <a:endParaRPr lang="en-GB" sz="1800" kern="100" dirty="0">
+                        <a:effectLst/>
+                        <a:latin typeface="Aptos" panose="020B0004020202020204" pitchFamily="34" charset="0"/>
+                        <a:ea typeface="Aptos" panose="020B0004020202020204" pitchFamily="34" charset="0"/>
+                        <a:cs typeface="Times New Roman" panose="02020603050405020304" pitchFamily="18" charset="0"/>
+                      </a:endParaRPr>
+                    </a:p>
+                  </a:txBody>
+                  <a:tcPr marL="36261" marR="36261" marT="0" marB="0" anchor="ctr"/>
+                </a:tc>
+                <a:extLst>
+                  <a:ext uri="{0D108BD9-81ED-4DB2-BD59-A6C34878D82A}">
+                    <a16:rowId xmlns:a16="http://schemas.microsoft.com/office/drawing/2014/main" val="3485862238"/>
+                  </a:ext>
+                </a:extLst>
+              </a:tr>
+            </a:tbl>
+          </a:graphicData>
+        </a:graphic>
+      </p:graphicFrame>
     </p:spTree>
     <p:extLst>
       <p:ext uri="{BB962C8B-B14F-4D97-AF65-F5344CB8AC3E}">

</xml_diff>

<commit_message>
update presentation & links
</commit_message>
<xml_diff>
--- a/Presentations/DayPlan/Full Presentation.pptx
+++ b/Presentations/DayPlan/Full Presentation.pptx
@@ -5,7 +5,7 @@
     <p:sldMasterId id="2147483648" r:id="rId1"/>
   </p:sldMasterIdLst>
   <p:notesMasterIdLst>
-    <p:notesMasterId r:id="rId39"/>
+    <p:notesMasterId r:id="rId40"/>
   </p:notesMasterIdLst>
   <p:sldIdLst>
     <p:sldId id="256" r:id="rId2"/>
@@ -43,8 +43,9 @@
     <p:sldId id="286" r:id="rId34"/>
     <p:sldId id="287" r:id="rId35"/>
     <p:sldId id="288" r:id="rId36"/>
-    <p:sldId id="289" r:id="rId37"/>
-    <p:sldId id="290" r:id="rId38"/>
+    <p:sldId id="293" r:id="rId37"/>
+    <p:sldId id="289" r:id="rId38"/>
+    <p:sldId id="290" r:id="rId39"/>
   </p:sldIdLst>
   <p:sldSz cx="12192000" cy="6858000"/>
   <p:notesSz cx="6858000" cy="9144000"/>
@@ -215,6 +216,7 @@
             <p14:sldId id="286"/>
             <p14:sldId id="287"/>
             <p14:sldId id="288"/>
+            <p14:sldId id="293"/>
           </p14:sldIdLst>
         </p14:section>
         <p14:section name="Wrap-Up" id="{78DFCD89-0308-8D45-B893-1D7CCF2696A8}">
@@ -230,6 +232,54 @@
     </p:ext>
   </p:extLst>
 </p:presentation>
+</file>
+
+<file path=ppt/authors.xml><?xml version="1.0" encoding="utf-8"?>
+<p188:authorLst xmlns:a="http://schemas.openxmlformats.org/drawingml/2006/main" xmlns:r="http://schemas.openxmlformats.org/officeDocument/2006/relationships" xmlns:p188="http://schemas.microsoft.com/office/powerpoint/2018/8/main">
+  <p188:author id="{27501E81-3D38-E351-5C63-CF52B247D951}" name="Josh Tyler" initials="" userId="S::jtyler@turing.ac.uk::4f8e6e44-ed5e-436e-8c55-f7c46c5754c5" providerId="AD"/>
+</p188:authorLst>
+</file>
+
+<file path=ppt/comments/modernComment_107_C48E8765.xml><?xml version="1.0" encoding="utf-8"?>
+<p188:cmLst xmlns:a="http://schemas.openxmlformats.org/drawingml/2006/main" xmlns:r="http://schemas.openxmlformats.org/officeDocument/2006/relationships" xmlns:p188="http://schemas.microsoft.com/office/powerpoint/2018/8/main">
+  <p188:cm id="{327FE79B-55C6-C548-B3FB-B288137AF903}" authorId="{27501E81-3D38-E351-5C63-CF52B247D951}" created="2025-01-14T11:43:04.885">
+    <pc:sldMkLst xmlns:pc="http://schemas.microsoft.com/office/powerpoint/2013/main/command">
+      <pc:docMk/>
+      <pc:sldMk cId="3297675109" sldId="263"/>
+    </pc:sldMkLst>
+    <p188:txBody>
+      <a:bodyPr/>
+      <a:lstStyle/>
+      <a:p>
+        <a:r>
+          <a:rPr lang="en-GB"/>
+          <a:t>Need PI Input</a:t>
+        </a:r>
+      </a:p>
+    </p188:txBody>
+  </p188:cm>
+</p188:cmLst>
+</file>
+
+<file path=ppt/comments/modernComment_120_B1E60396.xml><?xml version="1.0" encoding="utf-8"?>
+<p188:cmLst xmlns:a="http://schemas.openxmlformats.org/drawingml/2006/main" xmlns:r="http://schemas.openxmlformats.org/officeDocument/2006/relationships" xmlns:p188="http://schemas.microsoft.com/office/powerpoint/2018/8/main">
+  <p188:cm id="{70A50346-8C64-D24D-B9CF-07053E3EDFBF}" authorId="{27501E81-3D38-E351-5C63-CF52B247D951}" created="2025-01-14T11:42:47.459">
+    <pc:sldMkLst xmlns:pc="http://schemas.microsoft.com/office/powerpoint/2013/main/command">
+      <pc:docMk/>
+      <pc:sldMk cId="2984641430" sldId="288"/>
+    </pc:sldMkLst>
+    <p188:txBody>
+      <a:bodyPr/>
+      <a:lstStyle/>
+      <a:p>
+        <a:r>
+          <a:rPr lang="en-GB"/>
+          <a:t>Need PI Input</a:t>
+        </a:r>
+      </a:p>
+    </p188:txBody>
+  </p188:cm>
+</p188:cmLst>
 </file>
 
 <file path=ppt/diagrams/colors1.xml><?xml version="1.0" encoding="utf-8"?>
@@ -10988,7 +11038,7 @@
           <p:nvPr/>
         </p:nvPicPr>
         <p:blipFill>
-          <a:blip r:embed="rId2"/>
+          <a:blip r:embed="rId3"/>
           <a:stretch>
             <a:fillRect/>
           </a:stretch>
@@ -11057,6 +11107,11 @@
   <p:clrMapOvr>
     <a:masterClrMapping/>
   </p:clrMapOvr>
+  <p:extLst>
+    <p:ext uri="{6950BFC3-D8DA-4A85-94F7-54DA5524770B}">
+      <p188:commentRel xmlns:p188="http://schemas.microsoft.com/office/powerpoint/2018/8/main" r:id="rId2"/>
+    </p:ext>
+  </p:extLst>
 </p:sld>
 </file>
 
@@ -11123,10 +11178,86 @@
         </p:nvSpPr>
         <p:spPr/>
         <p:txBody>
-          <a:bodyPr/>
+          <a:bodyPr>
+            <a:normAutofit/>
+          </a:bodyPr>
           <a:lstStyle/>
           <a:p>
-            <a:endParaRPr lang="en-GB"/>
+            <a:pPr algn="l"/>
+            <a:r>
+              <a:rPr lang="en-GB" sz="2000" b="0" i="0" dirty="0">
+                <a:solidFill>
+                  <a:srgbClr val="212529"/>
+                </a:solidFill>
+                <a:effectLst/>
+                <a:latin typeface="Lato" panose="020F0502020204030203" pitchFamily="34" charset="0"/>
+              </a:rPr>
+              <a:t>This full-day event will bring together experts in a range of fields from industry, academia, and government to discuss cutting-edge research and explore collaborative opportunities within health.</a:t>
+            </a:r>
+          </a:p>
+          <a:p>
+            <a:pPr algn="l"/>
+            <a:r>
+              <a:rPr lang="en-GB" sz="2000" b="0" i="0" dirty="0">
+                <a:solidFill>
+                  <a:srgbClr val="212529"/>
+                </a:solidFill>
+                <a:effectLst/>
+                <a:latin typeface="Lato" panose="020F0502020204030203" pitchFamily="34" charset="0"/>
+              </a:rPr>
+              <a:t>Meeting participants will:</a:t>
+            </a:r>
+          </a:p>
+          <a:p>
+            <a:pPr lvl="1">
+              <a:buFont typeface="+mj-lt"/>
+              <a:buAutoNum type="arabicPeriod"/>
+            </a:pPr>
+            <a:r>
+              <a:rPr lang="en-GB" sz="1800" b="0" i="0" dirty="0">
+                <a:solidFill>
+                  <a:srgbClr val="212529"/>
+                </a:solidFill>
+                <a:effectLst/>
+                <a:latin typeface="Lato" panose="020F0502020204030203" pitchFamily="34" charset="0"/>
+              </a:rPr>
+              <a:t>Network with policy specialists and data scientists to discuss issues through a common language</a:t>
+            </a:r>
+          </a:p>
+          <a:p>
+            <a:pPr lvl="1">
+              <a:buFont typeface="+mj-lt"/>
+              <a:buAutoNum type="arabicPeriod"/>
+            </a:pPr>
+            <a:r>
+              <a:rPr lang="en-GB" sz="1800" b="0" i="0" dirty="0">
+                <a:solidFill>
+                  <a:srgbClr val="212529"/>
+                </a:solidFill>
+                <a:effectLst/>
+                <a:latin typeface="Lato" panose="020F0502020204030203" pitchFamily="34" charset="0"/>
+              </a:rPr>
+              <a:t>Identify forecasting challenges that the SPHERE-PPL Community will undertake and contribute to the design and outcomes of these endeavours to maximise their impact.</a:t>
+            </a:r>
+          </a:p>
+          <a:p>
+            <a:pPr lvl="1">
+              <a:buFont typeface="+mj-lt"/>
+              <a:buAutoNum type="arabicPeriod"/>
+            </a:pPr>
+            <a:r>
+              <a:rPr lang="en-GB" sz="1800" b="0" i="0" dirty="0">
+                <a:solidFill>
+                  <a:srgbClr val="212529"/>
+                </a:solidFill>
+                <a:effectLst/>
+                <a:latin typeface="Lato" panose="020F0502020204030203" pitchFamily="34" charset="0"/>
+              </a:rPr>
+              <a:t>Prioritise the training and support provided by SPHERE-PPL to the community to expedite the development of analytical capabilities where they are most urgently required</a:t>
+            </a:r>
+          </a:p>
+          <a:p>
+            <a:endParaRPr lang="en-GB" dirty="0"/>
           </a:p>
         </p:txBody>
       </p:sp>
@@ -11780,6 +11911,147 @@
           </a:p>
         </p:txBody>
       </p:sp>
+      <p:pic>
+        <p:nvPicPr>
+          <p:cNvPr id="1028" name="Picture 4">
+            <a:extLst>
+              <a:ext uri="{FF2B5EF4-FFF2-40B4-BE49-F238E27FC236}">
+                <a16:creationId xmlns:a16="http://schemas.microsoft.com/office/drawing/2014/main" id="{2F474156-F6F5-C716-B4CF-6AD272412E59}"/>
+              </a:ext>
+            </a:extLst>
+          </p:cNvPr>
+          <p:cNvPicPr>
+            <a:picLocks noChangeAspect="1" noChangeArrowheads="1"/>
+          </p:cNvPicPr>
+          <p:nvPr/>
+        </p:nvPicPr>
+        <p:blipFill>
+          <a:blip r:embed="rId2">
+            <a:extLst>
+              <a:ext uri="{28A0092B-C50C-407E-A947-70E740481C1C}">
+                <a14:useLocalDpi xmlns:a14="http://schemas.microsoft.com/office/drawing/2010/main" val="0"/>
+              </a:ext>
+            </a:extLst>
+          </a:blip>
+          <a:srcRect/>
+          <a:stretch>
+            <a:fillRect/>
+          </a:stretch>
+        </p:blipFill>
+        <p:spPr bwMode="auto">
+          <a:xfrm>
+            <a:off x="1050701" y="1561315"/>
+            <a:ext cx="1698723" cy="943735"/>
+          </a:xfrm>
+          <a:prstGeom prst="rect">
+            <a:avLst/>
+          </a:prstGeom>
+          <a:noFill/>
+          <a:extLst>
+            <a:ext uri="{909E8E84-426E-40DD-AFC4-6F175D3DCCD1}">
+              <a14:hiddenFill xmlns:a14="http://schemas.microsoft.com/office/drawing/2010/main">
+                <a:solidFill>
+                  <a:srgbClr val="FFFFFF"/>
+                </a:solidFill>
+              </a14:hiddenFill>
+            </a:ext>
+          </a:extLst>
+        </p:spPr>
+      </p:pic>
+      <p:pic>
+        <p:nvPicPr>
+          <p:cNvPr id="1032" name="Picture 8" descr="New Imperial logo">
+            <a:extLst>
+              <a:ext uri="{FF2B5EF4-FFF2-40B4-BE49-F238E27FC236}">
+                <a16:creationId xmlns:a16="http://schemas.microsoft.com/office/drawing/2014/main" id="{2A151004-36E1-9B76-E003-67A2DBF22F40}"/>
+              </a:ext>
+            </a:extLst>
+          </p:cNvPr>
+          <p:cNvPicPr>
+            <a:picLocks noChangeAspect="1" noChangeArrowheads="1"/>
+          </p:cNvPicPr>
+          <p:nvPr/>
+        </p:nvPicPr>
+        <p:blipFill>
+          <a:blip r:embed="rId3">
+            <a:extLst>
+              <a:ext uri="{28A0092B-C50C-407E-A947-70E740481C1C}">
+                <a14:useLocalDpi xmlns:a14="http://schemas.microsoft.com/office/drawing/2010/main" val="0"/>
+              </a:ext>
+            </a:extLst>
+          </a:blip>
+          <a:srcRect/>
+          <a:stretch>
+            <a:fillRect/>
+          </a:stretch>
+        </p:blipFill>
+        <p:spPr bwMode="auto">
+          <a:xfrm>
+            <a:off x="1125988" y="3119370"/>
+            <a:ext cx="1548148" cy="619259"/>
+          </a:xfrm>
+          <a:prstGeom prst="rect">
+            <a:avLst/>
+          </a:prstGeom>
+          <a:noFill/>
+          <a:extLst>
+            <a:ext uri="{909E8E84-426E-40DD-AFC4-6F175D3DCCD1}">
+              <a14:hiddenFill xmlns:a14="http://schemas.microsoft.com/office/drawing/2010/main">
+                <a:solidFill>
+                  <a:srgbClr val="FFFFFF"/>
+                </a:solidFill>
+              </a14:hiddenFill>
+            </a:ext>
+          </a:extLst>
+        </p:spPr>
+      </p:pic>
+      <p:pic>
+        <p:nvPicPr>
+          <p:cNvPr id="1034" name="Picture 10" descr="NHS BNSSG ICB">
+            <a:extLst>
+              <a:ext uri="{FF2B5EF4-FFF2-40B4-BE49-F238E27FC236}">
+                <a16:creationId xmlns:a16="http://schemas.microsoft.com/office/drawing/2014/main" id="{4264BD1A-8B6D-1561-CC4E-5D966CF9A6BD}"/>
+              </a:ext>
+            </a:extLst>
+          </p:cNvPr>
+          <p:cNvPicPr>
+            <a:picLocks noChangeAspect="1" noChangeArrowheads="1"/>
+          </p:cNvPicPr>
+          <p:nvPr/>
+        </p:nvPicPr>
+        <p:blipFill>
+          <a:blip r:embed="rId4">
+            <a:extLst>
+              <a:ext uri="{28A0092B-C50C-407E-A947-70E740481C1C}">
+                <a14:useLocalDpi xmlns:a14="http://schemas.microsoft.com/office/drawing/2010/main" val="0"/>
+              </a:ext>
+            </a:extLst>
+          </a:blip>
+          <a:srcRect/>
+          <a:stretch>
+            <a:fillRect/>
+          </a:stretch>
+        </p:blipFill>
+        <p:spPr bwMode="auto">
+          <a:xfrm>
+            <a:off x="1250052" y="4623182"/>
+            <a:ext cx="1300020" cy="476674"/>
+          </a:xfrm>
+          <a:prstGeom prst="rect">
+            <a:avLst/>
+          </a:prstGeom>
+          <a:noFill/>
+          <a:extLst>
+            <a:ext uri="{909E8E84-426E-40DD-AFC4-6F175D3DCCD1}">
+              <a14:hiddenFill xmlns:a14="http://schemas.microsoft.com/office/drawing/2010/main">
+                <a:solidFill>
+                  <a:srgbClr val="FFFFFF"/>
+                </a:solidFill>
+              </a14:hiddenFill>
+            </a:ext>
+          </a:extLst>
+        </p:spPr>
+      </p:pic>
     </p:spTree>
     <p:extLst>
       <p:ext uri="{BB962C8B-B14F-4D97-AF65-F5344CB8AC3E}">
@@ -15713,6 +15985,60 @@
           </a:p>
         </p:txBody>
       </p:sp>
+      <p:sp>
+        <p:nvSpPr>
+          <p:cNvPr id="5" name="Rectangle 4">
+            <a:extLst>
+              <a:ext uri="{FF2B5EF4-FFF2-40B4-BE49-F238E27FC236}">
+                <a16:creationId xmlns:a16="http://schemas.microsoft.com/office/drawing/2014/main" id="{A60D5253-9D73-E112-A198-EF4D356A42D3}"/>
+              </a:ext>
+            </a:extLst>
+          </p:cNvPr>
+          <p:cNvSpPr/>
+          <p:nvPr/>
+        </p:nvSpPr>
+        <p:spPr>
+          <a:xfrm>
+            <a:off x="642551" y="2749378"/>
+            <a:ext cx="10540314" cy="3021227"/>
+          </a:xfrm>
+          <a:prstGeom prst="rect">
+            <a:avLst/>
+          </a:prstGeom>
+          <a:solidFill>
+            <a:srgbClr val="FFFFFF">
+              <a:alpha val="78824"/>
+            </a:srgbClr>
+          </a:solidFill>
+          <a:ln>
+            <a:noFill/>
+          </a:ln>
+        </p:spPr>
+        <p:style>
+          <a:lnRef idx="2">
+            <a:schemeClr val="accent1">
+              <a:shade val="15000"/>
+            </a:schemeClr>
+          </a:lnRef>
+          <a:fillRef idx="1">
+            <a:schemeClr val="accent1"/>
+          </a:fillRef>
+          <a:effectRef idx="0">
+            <a:schemeClr val="accent1"/>
+          </a:effectRef>
+          <a:fontRef idx="minor">
+            <a:schemeClr val="lt1"/>
+          </a:fontRef>
+        </p:style>
+        <p:txBody>
+          <a:bodyPr rtlCol="0" anchor="ctr"/>
+          <a:lstStyle/>
+          <a:p>
+            <a:pPr algn="ctr"/>
+            <a:endParaRPr lang="en-GB"/>
+          </a:p>
+        </p:txBody>
+      </p:sp>
     </p:spTree>
     <p:extLst>
       <p:ext uri="{BB962C8B-B14F-4D97-AF65-F5344CB8AC3E}">
@@ -15925,7 +16251,10 @@
           <a:bodyPr/>
           <a:lstStyle/>
           <a:p>
-            <a:endParaRPr lang="en-GB"/>
+            <a:pPr marL="0" indent="0">
+              <a:buNone/>
+            </a:pPr>
+            <a:endParaRPr lang="en-GB" dirty="0"/>
           </a:p>
         </p:txBody>
       </p:sp>
@@ -15968,10 +16297,273 @@
   <p:clrMapOvr>
     <a:masterClrMapping/>
   </p:clrMapOvr>
+  <p:extLst>
+    <p:ext uri="{6950BFC3-D8DA-4A85-94F7-54DA5524770B}">
+      <p188:commentRel xmlns:p188="http://schemas.microsoft.com/office/powerpoint/2018/8/main" r:id="rId2"/>
+    </p:ext>
+  </p:extLst>
 </p:sld>
 </file>
 
 <file path=ppt/slides/slide36.xml><?xml version="1.0" encoding="utf-8"?>
+<p:sld xmlns:a="http://schemas.openxmlformats.org/drawingml/2006/main" xmlns:r="http://schemas.openxmlformats.org/officeDocument/2006/relationships" xmlns:p="http://schemas.openxmlformats.org/presentationml/2006/main">
+  <p:cSld>
+    <p:spTree>
+      <p:nvGrpSpPr>
+        <p:cNvPr id="1" name="">
+          <a:extLst>
+            <a:ext uri="{FF2B5EF4-FFF2-40B4-BE49-F238E27FC236}">
+              <a16:creationId xmlns:a16="http://schemas.microsoft.com/office/drawing/2014/main" id="{A938517E-6C67-779A-0B4F-34D1C9FBD2F8}"/>
+            </a:ext>
+          </a:extLst>
+        </p:cNvPr>
+        <p:cNvGrpSpPr/>
+        <p:nvPr/>
+      </p:nvGrpSpPr>
+      <p:grpSpPr>
+        <a:xfrm>
+          <a:off x="0" y="0"/>
+          <a:ext cx="0" cy="0"/>
+          <a:chOff x="0" y="0"/>
+          <a:chExt cx="0" cy="0"/>
+        </a:xfrm>
+      </p:grpSpPr>
+      <p:sp>
+        <p:nvSpPr>
+          <p:cNvPr id="2" name="Title 1">
+            <a:extLst>
+              <a:ext uri="{FF2B5EF4-FFF2-40B4-BE49-F238E27FC236}">
+                <a16:creationId xmlns:a16="http://schemas.microsoft.com/office/drawing/2014/main" id="{8AEA457A-B597-ED6D-271E-524490A56483}"/>
+              </a:ext>
+            </a:extLst>
+          </p:cNvPr>
+          <p:cNvSpPr>
+            <a:spLocks noGrp="1"/>
+          </p:cNvSpPr>
+          <p:nvPr>
+            <p:ph type="title"/>
+          </p:nvPr>
+        </p:nvSpPr>
+        <p:spPr/>
+        <p:txBody>
+          <a:bodyPr/>
+          <a:lstStyle/>
+          <a:p>
+            <a:r>
+              <a:rPr lang="en-GB" dirty="0"/>
+              <a:t>How its going to work!</a:t>
+            </a:r>
+          </a:p>
+        </p:txBody>
+      </p:sp>
+      <p:sp>
+        <p:nvSpPr>
+          <p:cNvPr id="3" name="Content Placeholder 2">
+            <a:extLst>
+              <a:ext uri="{FF2B5EF4-FFF2-40B4-BE49-F238E27FC236}">
+                <a16:creationId xmlns:a16="http://schemas.microsoft.com/office/drawing/2014/main" id="{72F5CDBB-6D96-13A4-B21C-E2EF1623377F}"/>
+              </a:ext>
+            </a:extLst>
+          </p:cNvPr>
+          <p:cNvSpPr>
+            <a:spLocks noGrp="1"/>
+          </p:cNvSpPr>
+          <p:nvPr>
+            <p:ph idx="1"/>
+          </p:nvPr>
+        </p:nvSpPr>
+        <p:spPr/>
+        <p:txBody>
+          <a:bodyPr>
+            <a:noAutofit/>
+          </a:bodyPr>
+          <a:lstStyle/>
+          <a:p>
+            <a:r>
+              <a:rPr lang="en-GB" sz="1800" b="1" dirty="0">
+                <a:solidFill>
+                  <a:srgbClr val="004D9E"/>
+                </a:solidFill>
+              </a:rPr>
+              <a:t>Stage 1 – What can SPHERE-PPL do for you? (10 minutes)</a:t>
+            </a:r>
+          </a:p>
+          <a:p>
+            <a:pPr lvl="1"/>
+            <a:r>
+              <a:rPr lang="en-GB" sz="1800" dirty="0"/>
+              <a:t>Quick presentation from the SPHERE-PPL team on what the future holds</a:t>
+            </a:r>
+          </a:p>
+          <a:p>
+            <a:pPr marL="457200" lvl="1" indent="0">
+              <a:buNone/>
+            </a:pPr>
+            <a:endParaRPr lang="en-GB" sz="1800" b="1" dirty="0">
+              <a:solidFill>
+                <a:srgbClr val="004D9E"/>
+              </a:solidFill>
+            </a:endParaRPr>
+          </a:p>
+          <a:p>
+            <a:r>
+              <a:rPr lang="en-GB" sz="1800" b="1" dirty="0">
+                <a:solidFill>
+                  <a:srgbClr val="004D9E"/>
+                </a:solidFill>
+              </a:rPr>
+              <a:t>Stage 2 – Brainstorming requests for workshops, training and support (20 minutes)</a:t>
+            </a:r>
+          </a:p>
+          <a:p>
+            <a:pPr lvl="1"/>
+            <a:r>
+              <a:rPr lang="en-GB" sz="1800" dirty="0"/>
+              <a:t>Split into groups and make a list of different ideas that would help you make progress in your area (added on the Mural Board)</a:t>
+            </a:r>
+          </a:p>
+          <a:p>
+            <a:pPr lvl="1"/>
+            <a:r>
+              <a:rPr lang="en-GB" sz="1800" dirty="0"/>
+              <a:t>Include as many details as possible!</a:t>
+            </a:r>
+          </a:p>
+          <a:p>
+            <a:pPr marL="457200" lvl="1" indent="0">
+              <a:buNone/>
+            </a:pPr>
+            <a:endParaRPr lang="en-GB" sz="1400" dirty="0"/>
+          </a:p>
+          <a:p>
+            <a:r>
+              <a:rPr lang="en-GB" sz="1800" b="1" dirty="0">
+                <a:solidFill>
+                  <a:srgbClr val="004D9E"/>
+                </a:solidFill>
+              </a:rPr>
+              <a:t>Stage 3 – Creating a community priority list (30 minutes)</a:t>
+            </a:r>
+          </a:p>
+          <a:p>
+            <a:pPr lvl="1"/>
+            <a:r>
+              <a:rPr lang="en-GB" sz="1800" dirty="0"/>
+              <a:t>Each team will give an overview of their requests</a:t>
+            </a:r>
+          </a:p>
+          <a:p>
+            <a:pPr lvl="1"/>
+            <a:r>
+              <a:rPr lang="en-GB" sz="1800" dirty="0"/>
+              <a:t>Discussion around how the SPHERE-PPL community can best facilitate and maximise value</a:t>
+            </a:r>
+          </a:p>
+          <a:p>
+            <a:pPr marL="0" indent="0">
+              <a:buNone/>
+            </a:pPr>
+            <a:endParaRPr lang="en-GB" sz="1800" dirty="0"/>
+          </a:p>
+        </p:txBody>
+      </p:sp>
+      <p:sp>
+        <p:nvSpPr>
+          <p:cNvPr id="4" name="Footer Placeholder 3">
+            <a:extLst>
+              <a:ext uri="{FF2B5EF4-FFF2-40B4-BE49-F238E27FC236}">
+                <a16:creationId xmlns:a16="http://schemas.microsoft.com/office/drawing/2014/main" id="{3A5C9511-5B78-AE1C-87E6-72B9A5FBA7F7}"/>
+              </a:ext>
+            </a:extLst>
+          </p:cNvPr>
+          <p:cNvSpPr>
+            <a:spLocks noGrp="1"/>
+          </p:cNvSpPr>
+          <p:nvPr>
+            <p:ph type="ftr" sz="quarter" idx="11"/>
+          </p:nvPr>
+        </p:nvSpPr>
+        <p:spPr/>
+        <p:txBody>
+          <a:bodyPr/>
+          <a:lstStyle/>
+          <a:p>
+            <a:r>
+              <a:rPr lang="en-US"/>
+              <a:t>Spatial, Health &amp; Environmental Research using Probabilistic Programming Languages</a:t>
+            </a:r>
+            <a:endParaRPr lang="en-US" dirty="0"/>
+          </a:p>
+        </p:txBody>
+      </p:sp>
+      <p:sp>
+        <p:nvSpPr>
+          <p:cNvPr id="5" name="Rectangle 4">
+            <a:extLst>
+              <a:ext uri="{FF2B5EF4-FFF2-40B4-BE49-F238E27FC236}">
+                <a16:creationId xmlns:a16="http://schemas.microsoft.com/office/drawing/2014/main" id="{91FCDF88-7FBB-44E5-024C-06F50EA3BFD9}"/>
+              </a:ext>
+            </a:extLst>
+          </p:cNvPr>
+          <p:cNvSpPr/>
+          <p:nvPr/>
+        </p:nvSpPr>
+        <p:spPr>
+          <a:xfrm flipV="1">
+            <a:off x="642551" y="1646239"/>
+            <a:ext cx="10540314" cy="1103140"/>
+          </a:xfrm>
+          <a:prstGeom prst="rect">
+            <a:avLst/>
+          </a:prstGeom>
+          <a:solidFill>
+            <a:srgbClr val="FFFFFF">
+              <a:alpha val="78824"/>
+            </a:srgbClr>
+          </a:solidFill>
+          <a:ln>
+            <a:noFill/>
+          </a:ln>
+        </p:spPr>
+        <p:style>
+          <a:lnRef idx="2">
+            <a:schemeClr val="accent1">
+              <a:shade val="15000"/>
+            </a:schemeClr>
+          </a:lnRef>
+          <a:fillRef idx="1">
+            <a:schemeClr val="accent1"/>
+          </a:fillRef>
+          <a:effectRef idx="0">
+            <a:schemeClr val="accent1"/>
+          </a:effectRef>
+          <a:fontRef idx="minor">
+            <a:schemeClr val="lt1"/>
+          </a:fontRef>
+        </p:style>
+        <p:txBody>
+          <a:bodyPr rtlCol="0" anchor="ctr"/>
+          <a:lstStyle/>
+          <a:p>
+            <a:pPr algn="ctr"/>
+            <a:endParaRPr lang="en-GB"/>
+          </a:p>
+        </p:txBody>
+      </p:sp>
+    </p:spTree>
+    <p:extLst>
+      <p:ext uri="{BB962C8B-B14F-4D97-AF65-F5344CB8AC3E}">
+        <p14:creationId xmlns:p14="http://schemas.microsoft.com/office/powerpoint/2010/main" val="3170463350"/>
+      </p:ext>
+    </p:extLst>
+  </p:cSld>
+  <p:clrMapOvr>
+    <a:masterClrMapping/>
+  </p:clrMapOvr>
+</p:sld>
+</file>
+
+<file path=ppt/slides/slide37.xml><?xml version="1.0" encoding="utf-8"?>
 <p:sld xmlns:a="http://schemas.openxmlformats.org/drawingml/2006/main" xmlns:r="http://schemas.openxmlformats.org/officeDocument/2006/relationships" xmlns:p="http://schemas.openxmlformats.org/presentationml/2006/main">
   <p:cSld>
     <p:spTree>
@@ -16158,7 +16750,7 @@
 </p:sld>
 </file>
 
-<file path=ppt/slides/slide37.xml><?xml version="1.0" encoding="utf-8"?>
+<file path=ppt/slides/slide38.xml><?xml version="1.0" encoding="utf-8"?>
 <p:sld xmlns:a="http://schemas.openxmlformats.org/drawingml/2006/main" xmlns:r="http://schemas.openxmlformats.org/officeDocument/2006/relationships" xmlns:p="http://schemas.openxmlformats.org/presentationml/2006/main">
   <p:cSld>
     <p:spTree>
@@ -16420,11 +17012,13 @@
         <p:spPr>
           <a:xfrm>
             <a:off x="838200" y="1825625"/>
-            <a:ext cx="10515600" cy="1220316"/>
+            <a:ext cx="10515600" cy="1983366"/>
           </a:xfrm>
         </p:spPr>
         <p:txBody>
-          <a:bodyPr/>
+          <a:bodyPr>
+            <a:normAutofit/>
+          </a:bodyPr>
           <a:lstStyle/>
           <a:p>
             <a:pPr marL="0" indent="0">
@@ -16442,6 +17036,15 @@
             <a:r>
               <a:rPr lang="en-GB" dirty="0"/>
               <a:t>Password: clicking seventh void compiled</a:t>
+            </a:r>
+          </a:p>
+          <a:p>
+            <a:pPr marL="0" indent="0">
+              <a:buNone/>
+            </a:pPr>
+            <a:r>
+              <a:rPr lang="en-GB" dirty="0"/>
+              <a:t>(Password contains spaces)</a:t>
             </a:r>
           </a:p>
         </p:txBody>
@@ -16969,7 +17572,7 @@
             <p:ph idx="1"/>
             <p:extLst>
               <p:ext uri="{D42A27DB-BD31-4B8C-83A1-F6EECF244321}">
-                <p14:modId xmlns:p14="http://schemas.microsoft.com/office/powerpoint/2010/main" val="3266369457"/>
+                <p14:modId xmlns:p14="http://schemas.microsoft.com/office/powerpoint/2010/main" val="767211036"/>
               </p:ext>
             </p:extLst>
           </p:nvPr>
@@ -16992,14 +17595,14 @@
                     </a:ext>
                   </a:extLst>
                 </a:gridCol>
-                <a:gridCol w="3228053">
+                <a:gridCol w="3325667">
                   <a:extLst>
                     <a:ext uri="{9D8B030D-6E8A-4147-A177-3AD203B41FA5}">
                       <a16:colId xmlns:a16="http://schemas.microsoft.com/office/drawing/2014/main" val="2325865302"/>
                     </a:ext>
                   </a:extLst>
                 </a:gridCol>
-                <a:gridCol w="5208706">
+                <a:gridCol w="5111092">
                   <a:extLst>
                     <a:ext uri="{9D8B030D-6E8A-4147-A177-3AD203B41FA5}">
                       <a16:colId xmlns:a16="http://schemas.microsoft.com/office/drawing/2014/main" val="3533379028"/>
@@ -17086,7 +17689,7 @@
                     <a:p>
                       <a:pPr algn="l"/>
                       <a:r>
-                        <a:rPr lang="en-GB" sz="1600">
+                        <a:rPr lang="en-GB" sz="1600" u="none">
                           <a:solidFill>
                             <a:schemeClr val="tx1"/>
                           </a:solidFill>
@@ -17145,7 +17748,7 @@
                     <a:p>
                       <a:pPr algn="l"/>
                       <a:r>
-                        <a:rPr lang="en-GB" sz="1600" dirty="0">
+                        <a:rPr lang="en-GB" sz="1600" u="none" dirty="0">
                           <a:solidFill>
                             <a:schemeClr val="tx1"/>
                           </a:solidFill>
@@ -17204,7 +17807,7 @@
                     <a:p>
                       <a:pPr algn="l"/>
                       <a:r>
-                        <a:rPr lang="en-GB" sz="1600" dirty="0">
+                        <a:rPr lang="en-GB" sz="1600" u="none" dirty="0">
                           <a:solidFill>
                             <a:schemeClr val="tx1"/>
                           </a:solidFill>
@@ -17266,31 +17869,24 @@
                     <a:p>
                       <a:pPr algn="l"/>
                       <a:r>
-                        <a:rPr lang="en-GB" sz="1600" dirty="0">
+                        <a:rPr lang="en-GB" sz="1600" u="none" dirty="0">
                           <a:solidFill>
                             <a:schemeClr val="tx1"/>
                           </a:solidFill>
                           <a:effectLst/>
                         </a:rPr>
-                        <a:t>Keynote 1 - </a:t>
+                        <a:t>Keynote 1 – Dr Hannah Rose </a:t>
                       </a:r>
                       <a:r>
-                        <a:rPr lang="en-GB" sz="1600" dirty="0">
+                        <a:rPr lang="en-GB" sz="1600" u="none" dirty="0" err="1">
                           <a:solidFill>
                             <a:schemeClr val="tx1"/>
                           </a:solidFill>
                           <a:effectLst/>
-                          <a:hlinkClick r:id="rId2">
-                            <a:extLst>
-                              <a:ext uri="{A12FA001-AC4F-418D-AE19-62706E023703}">
-                                <ahyp:hlinkClr xmlns:ahyp="http://schemas.microsoft.com/office/drawing/2018/hyperlinkcolor" val="tx"/>
-                              </a:ext>
-                            </a:extLst>
-                          </a:hlinkClick>
                         </a:rPr>
-                        <a:t>Dr Lauren Cator</a:t>
+                        <a:t>Vineer</a:t>
                       </a:r>
-                      <a:endParaRPr lang="en-GB" sz="1600" dirty="0">
+                      <a:endParaRPr lang="en-GB" sz="1600" u="none" dirty="0">
                         <a:solidFill>
                           <a:schemeClr val="tx1"/>
                         </a:solidFill>
@@ -17350,36 +17946,14 @@
                     <a:p>
                       <a:pPr algn="l"/>
                       <a:r>
-                        <a:rPr lang="en-GB" sz="1600" dirty="0">
+                        <a:rPr lang="en-GB" sz="1600" u="none" dirty="0">
                           <a:solidFill>
                             <a:schemeClr val="tx1"/>
                           </a:solidFill>
                           <a:effectLst/>
                         </a:rPr>
-                        <a:t>Keynote 2 - </a:t>
+                        <a:t>Keynote 2 - Dr Will Pearse</a:t>
                       </a:r>
-                      <a:r>
-                        <a:rPr lang="en-GB" sz="1600" dirty="0">
-                          <a:solidFill>
-                            <a:schemeClr val="tx1"/>
-                          </a:solidFill>
-                          <a:effectLst/>
-                          <a:hlinkClick r:id="rId3">
-                            <a:extLst>
-                              <a:ext uri="{A12FA001-AC4F-418D-AE19-62706E023703}">
-                                <ahyp:hlinkClr xmlns:ahyp="http://schemas.microsoft.com/office/drawing/2018/hyperlinkcolor" val="tx"/>
-                              </a:ext>
-                            </a:extLst>
-                          </a:hlinkClick>
-                        </a:rPr>
-                        <a:t>Dr Will Pearse</a:t>
-                      </a:r>
-                      <a:endParaRPr lang="en-GB" sz="1600" dirty="0">
-                        <a:solidFill>
-                          <a:schemeClr val="tx1"/>
-                        </a:solidFill>
-                        <a:effectLst/>
-                      </a:endParaRPr>
                     </a:p>
                   </a:txBody>
                   <a:tcPr anchor="ctr"/>
@@ -17434,36 +18008,14 @@
                     <a:p>
                       <a:pPr algn="l"/>
                       <a:r>
-                        <a:rPr lang="en-GB" sz="1600" dirty="0">
+                        <a:rPr lang="en-GB" sz="1600" u="none" dirty="0">
                           <a:solidFill>
                             <a:schemeClr val="tx1"/>
                           </a:solidFill>
                           <a:effectLst/>
                         </a:rPr>
-                        <a:t>Keynote 3 - </a:t>
+                        <a:t>Keynote 3 - Dr Richard Wood</a:t>
                       </a:r>
-                      <a:r>
-                        <a:rPr lang="en-GB" sz="1600" dirty="0">
-                          <a:solidFill>
-                            <a:schemeClr val="tx1"/>
-                          </a:solidFill>
-                          <a:effectLst/>
-                          <a:hlinkClick r:id="rId4">
-                            <a:extLst>
-                              <a:ext uri="{A12FA001-AC4F-418D-AE19-62706E023703}">
-                                <ahyp:hlinkClr xmlns:ahyp="http://schemas.microsoft.com/office/drawing/2018/hyperlinkcolor" val="tx"/>
-                              </a:ext>
-                            </a:extLst>
-                          </a:hlinkClick>
-                        </a:rPr>
-                        <a:t>Dr Richard Wood</a:t>
-                      </a:r>
-                      <a:endParaRPr lang="en-GB" sz="1600" dirty="0">
-                        <a:solidFill>
-                          <a:schemeClr val="tx1"/>
-                        </a:solidFill>
-                        <a:effectLst/>
-                      </a:endParaRPr>
                     </a:p>
                   </a:txBody>
                   <a:tcPr anchor="ctr"/>
@@ -17518,7 +18070,7 @@
                     <a:p>
                       <a:pPr algn="l"/>
                       <a:r>
-                        <a:rPr lang="en-GB" sz="1600" dirty="0">
+                        <a:rPr lang="en-GB" sz="1600" u="none" dirty="0">
                           <a:solidFill>
                             <a:schemeClr val="tx1"/>
                           </a:solidFill>
@@ -17577,7 +18129,7 @@
                     <a:p>
                       <a:pPr algn="l"/>
                       <a:r>
-                        <a:rPr lang="en-GB" sz="1600" dirty="0">
+                        <a:rPr lang="en-GB" sz="1600" u="none" dirty="0">
                           <a:solidFill>
                             <a:schemeClr val="tx1"/>
                           </a:solidFill>
@@ -17639,7 +18191,7 @@
                     <a:p>
                       <a:pPr algn="l"/>
                       <a:r>
-                        <a:rPr lang="en-GB" sz="1600">
+                        <a:rPr lang="en-GB" sz="1600" u="none">
                           <a:solidFill>
                             <a:schemeClr val="tx1"/>
                           </a:solidFill>
@@ -17701,7 +18253,7 @@
                     <a:p>
                       <a:pPr algn="l"/>
                       <a:r>
-                        <a:rPr lang="en-GB" sz="1600">
+                        <a:rPr lang="en-GB" sz="1600" u="none" dirty="0">
                           <a:solidFill>
                             <a:schemeClr val="tx1"/>
                           </a:solidFill>
@@ -17840,7 +18392,7 @@
             <p:ph idx="1"/>
             <p:extLst>
               <p:ext uri="{D42A27DB-BD31-4B8C-83A1-F6EECF244321}">
-                <p14:modId xmlns:p14="http://schemas.microsoft.com/office/powerpoint/2010/main" val="962973977"/>
+                <p14:modId xmlns:p14="http://schemas.microsoft.com/office/powerpoint/2010/main" val="8909800"/>
               </p:ext>
             </p:extLst>
           </p:nvPr>
@@ -18168,34 +18720,8 @@
                           <a:latin typeface="Arial" panose="020B0604020202020204" pitchFamily="34" charset="0"/>
                           <a:cs typeface="Arial" panose="020B0604020202020204" pitchFamily="34" charset="0"/>
                         </a:rPr>
-                        <a:t>Presentation - </a:t>
+                        <a:t>Presentation</a:t>
                       </a:r>
-                      <a:r>
-                        <a:rPr lang="en-GB" sz="1600" dirty="0">
-                          <a:solidFill>
-                            <a:schemeClr val="tx1"/>
-                          </a:solidFill>
-                          <a:effectLst/>
-                          <a:latin typeface="Arial" panose="020B0604020202020204" pitchFamily="34" charset="0"/>
-                          <a:cs typeface="Arial" panose="020B0604020202020204" pitchFamily="34" charset="0"/>
-                          <a:hlinkClick r:id="rId2">
-                            <a:extLst>
-                              <a:ext uri="{A12FA001-AC4F-418D-AE19-62706E023703}">
-                                <ahyp:hlinkClr xmlns:ahyp="http://schemas.microsoft.com/office/drawing/2018/hyperlinkcolor" val="tx"/>
-                              </a:ext>
-                            </a:extLst>
-                          </a:hlinkClick>
-                        </a:rPr>
-                        <a:t>Dr Josh Tyler</a:t>
-                      </a:r>
-                      <a:endParaRPr lang="en-GB" sz="1600" dirty="0">
-                        <a:solidFill>
-                          <a:schemeClr val="tx1"/>
-                        </a:solidFill>
-                        <a:effectLst/>
-                        <a:latin typeface="Arial" panose="020B0604020202020204" pitchFamily="34" charset="0"/>
-                        <a:cs typeface="Arial" panose="020B0604020202020204" pitchFamily="34" charset="0"/>
-                      </a:endParaRPr>
                     </a:p>
                   </a:txBody>
                   <a:tcPr anchor="ctr"/>

</xml_diff>